<commit_message>
updated date in slides
</commit_message>
<xml_diff>
--- a/docs/slides.pptx
+++ b/docs/slides.pptx
@@ -3721,7 +3721,11 @@
           <a:p>
             <a:r>
               <a:rPr lang="ru-RU" dirty="0" smtClean="0"/>
-              <a:t>СПбГУ, Санкт-Петербург, май 2012 </a:t>
+              <a:t>СПбГУ, Санкт-Петербург, </a:t>
+            </a:r>
+            <a:r>
+              <a:rPr lang="ru-RU" dirty="0" smtClean="0"/>
+              <a:t>июнь 2012 </a:t>
             </a:r>
             <a:endParaRPr lang="en-US" dirty="0"/>
           </a:p>

</xml_diff>